<commit_message>
Update Term project proposal.pptx
ㅈㅔ가 고의로 알람을 보내려고 했던 것은 아니지만.. 혹시 알람이 갔다면.. 죄송합니다..ㅠㅠㅠㅠ
</commit_message>
<xml_diff>
--- a/200605/Term project proposal.pptx
+++ b/200605/Term project proposal.pptx
@@ -282,7 +282,7 @@
           <a:p>
             <a:fld id="{F7232416-3236-4BEC-9F65-32C6B7F68842}" type="datetimeFigureOut">
               <a:rPr lang="ko-KR" altLang="en-US" smtClean="0"/>
-              <a:t>2020-06-05</a:t>
+              <a:t>2020-06-07</a:t>
             </a:fld>
             <a:endParaRPr lang="ko-KR" altLang="en-US"/>
           </a:p>
@@ -480,7 +480,7 @@
           <a:p>
             <a:fld id="{F7232416-3236-4BEC-9F65-32C6B7F68842}" type="datetimeFigureOut">
               <a:rPr lang="ko-KR" altLang="en-US" smtClean="0"/>
-              <a:t>2020-06-05</a:t>
+              <a:t>2020-06-07</a:t>
             </a:fld>
             <a:endParaRPr lang="ko-KR" altLang="en-US"/>
           </a:p>
@@ -688,7 +688,7 @@
           <a:p>
             <a:fld id="{F7232416-3236-4BEC-9F65-32C6B7F68842}" type="datetimeFigureOut">
               <a:rPr lang="ko-KR" altLang="en-US" smtClean="0"/>
-              <a:t>2020-06-05</a:t>
+              <a:t>2020-06-07</a:t>
             </a:fld>
             <a:endParaRPr lang="ko-KR" altLang="en-US"/>
           </a:p>
@@ -886,7 +886,7 @@
           <a:p>
             <a:fld id="{F7232416-3236-4BEC-9F65-32C6B7F68842}" type="datetimeFigureOut">
               <a:rPr lang="ko-KR" altLang="en-US" smtClean="0"/>
-              <a:t>2020-06-05</a:t>
+              <a:t>2020-06-07</a:t>
             </a:fld>
             <a:endParaRPr lang="ko-KR" altLang="en-US"/>
           </a:p>
@@ -1161,7 +1161,7 @@
           <a:p>
             <a:fld id="{F7232416-3236-4BEC-9F65-32C6B7F68842}" type="datetimeFigureOut">
               <a:rPr lang="ko-KR" altLang="en-US" smtClean="0"/>
-              <a:t>2020-06-05</a:t>
+              <a:t>2020-06-07</a:t>
             </a:fld>
             <a:endParaRPr lang="ko-KR" altLang="en-US"/>
           </a:p>
@@ -1426,7 +1426,7 @@
           <a:p>
             <a:fld id="{F7232416-3236-4BEC-9F65-32C6B7F68842}" type="datetimeFigureOut">
               <a:rPr lang="ko-KR" altLang="en-US" smtClean="0"/>
-              <a:t>2020-06-05</a:t>
+              <a:t>2020-06-07</a:t>
             </a:fld>
             <a:endParaRPr lang="ko-KR" altLang="en-US"/>
           </a:p>
@@ -1838,7 +1838,7 @@
           <a:p>
             <a:fld id="{F7232416-3236-4BEC-9F65-32C6B7F68842}" type="datetimeFigureOut">
               <a:rPr lang="ko-KR" altLang="en-US" smtClean="0"/>
-              <a:t>2020-06-05</a:t>
+              <a:t>2020-06-07</a:t>
             </a:fld>
             <a:endParaRPr lang="ko-KR" altLang="en-US"/>
           </a:p>
@@ -1979,7 +1979,7 @@
           <a:p>
             <a:fld id="{F7232416-3236-4BEC-9F65-32C6B7F68842}" type="datetimeFigureOut">
               <a:rPr lang="ko-KR" altLang="en-US" smtClean="0"/>
-              <a:t>2020-06-05</a:t>
+              <a:t>2020-06-07</a:t>
             </a:fld>
             <a:endParaRPr lang="ko-KR" altLang="en-US"/>
           </a:p>
@@ -2092,7 +2092,7 @@
           <a:p>
             <a:fld id="{F7232416-3236-4BEC-9F65-32C6B7F68842}" type="datetimeFigureOut">
               <a:rPr lang="ko-KR" altLang="en-US" smtClean="0"/>
-              <a:t>2020-06-05</a:t>
+              <a:t>2020-06-07</a:t>
             </a:fld>
             <a:endParaRPr lang="ko-KR" altLang="en-US"/>
           </a:p>
@@ -2403,7 +2403,7 @@
           <a:p>
             <a:fld id="{F7232416-3236-4BEC-9F65-32C6B7F68842}" type="datetimeFigureOut">
               <a:rPr lang="ko-KR" altLang="en-US" smtClean="0"/>
-              <a:t>2020-06-05</a:t>
+              <a:t>2020-06-07</a:t>
             </a:fld>
             <a:endParaRPr lang="ko-KR" altLang="en-US"/>
           </a:p>
@@ -2691,7 +2691,7 @@
           <a:p>
             <a:fld id="{F7232416-3236-4BEC-9F65-32C6B7F68842}" type="datetimeFigureOut">
               <a:rPr lang="ko-KR" altLang="en-US" smtClean="0"/>
-              <a:t>2020-06-05</a:t>
+              <a:t>2020-06-07</a:t>
             </a:fld>
             <a:endParaRPr lang="ko-KR" altLang="en-US"/>
           </a:p>
@@ -2932,7 +2932,7 @@
           <a:p>
             <a:fld id="{F7232416-3236-4BEC-9F65-32C6B7F68842}" type="datetimeFigureOut">
               <a:rPr lang="ko-KR" altLang="en-US" smtClean="0"/>
-              <a:t>2020-06-05</a:t>
+              <a:t>2020-06-07</a:t>
             </a:fld>
             <a:endParaRPr lang="ko-KR" altLang="en-US"/>
           </a:p>
@@ -3364,47 +3364,11 @@
         <p:grpSpPr>
           <a:xfrm>
             <a:off x="4382219" y="1549799"/>
-            <a:ext cx="7704817" cy="5197414"/>
+            <a:ext cx="3392051" cy="3841710"/>
             <a:chOff x="4382219" y="1549799"/>
-            <a:chExt cx="7704817" cy="5197414"/>
+            <a:chExt cx="3392051" cy="3841710"/>
           </a:xfrm>
         </p:grpSpPr>
-        <p:pic>
-          <p:nvPicPr>
-            <p:cNvPr id="4" name="그림 3">
-              <a:extLst>
-                <a:ext uri="{FF2B5EF4-FFF2-40B4-BE49-F238E27FC236}">
-                  <a16:creationId xmlns:a16="http://schemas.microsoft.com/office/drawing/2014/main" id="{E12CC33F-59C0-4E33-AEC6-7A3D4E6A39A9}"/>
-                </a:ext>
-              </a:extLst>
-            </p:cNvPr>
-            <p:cNvPicPr>
-              <a:picLocks noChangeAspect="1"/>
-            </p:cNvPicPr>
-            <p:nvPr/>
-          </p:nvPicPr>
-          <p:blipFill>
-            <a:blip r:embed="rId2" cstate="print">
-              <a:extLst>
-                <a:ext uri="{28A0092B-C50C-407E-A947-70E740481C1C}">
-                  <a14:useLocalDpi xmlns:a14="http://schemas.microsoft.com/office/drawing/2010/main" val="0"/>
-                </a:ext>
-              </a:extLst>
-            </a:blip>
-            <a:stretch>
-              <a:fillRect/>
-            </a:stretch>
-          </p:blipFill>
-          <p:spPr>
-            <a:xfrm>
-              <a:off x="10722472" y="5197414"/>
-              <a:ext cx="1364564" cy="1549799"/>
-            </a:xfrm>
-            <a:prstGeom prst="rect">
-              <a:avLst/>
-            </a:prstGeom>
-          </p:spPr>
-        </p:pic>
         <p:sp>
           <p:nvSpPr>
             <p:cNvPr id="2" name="직사각형 1">
@@ -3519,7 +3483,7 @@
           <p:spPr>
             <a:xfrm>
               <a:off x="5601190" y="4661870"/>
-              <a:ext cx="954107" cy="646331"/>
+              <a:ext cx="954107" cy="461665"/>
             </a:xfrm>
             <a:prstGeom prst="rect">
               <a:avLst/>
@@ -3570,29 +3534,6 @@
               </a:endParaRPr>
             </a:p>
             <a:p>
-              <a:pPr algn="ctr">
-                <a:defRPr/>
-              </a:pPr>
-              <a:r>
-                <a:rPr lang="en-US" altLang="ko-KR" sz="1200" dirty="0">
-                  <a:ln w="9525">
-                    <a:solidFill>
-                      <a:schemeClr val="accent1">
-                        <a:lumMod val="75000"/>
-                        <a:alpha val="30000"/>
-                      </a:schemeClr>
-                    </a:solidFill>
-                  </a:ln>
-                  <a:solidFill>
-                    <a:schemeClr val="accent1"/>
-                  </a:solidFill>
-                  <a:latin typeface="바탕체"/>
-                  <a:ea typeface="바탕체"/>
-                </a:rPr>
-                <a:t>21812009</a:t>
-              </a:r>
-            </a:p>
-            <a:p>
               <a:pPr lvl="0" algn="ctr">
                 <a:defRPr/>
               </a:pPr>
@@ -3627,7 +3568,7 @@
     <mc:Choice Requires="p14">
       <p:transition/>
     </mc:Choice>
-    <mc:Fallback xmlns="" xmlns:c="http://schemas.openxmlformats.org/drawingml/2006/chart" xmlns:dgm="http://schemas.openxmlformats.org/drawingml/2006/diagram" xmlns:dsp="http://schemas.microsoft.com/office/drawing/2008/diagram">
+    <mc:Fallback xmlns:dsp="http://schemas.microsoft.com/office/drawing/2008/diagram" xmlns:dgm="http://schemas.openxmlformats.org/drawingml/2006/diagram" xmlns:c="http://schemas.openxmlformats.org/drawingml/2006/chart" xmlns="">
       <p:transition/>
     </mc:Fallback>
   </mc:AlternateContent>
@@ -4163,7 +4104,7 @@
     <mc:Choice Requires="p14">
       <p:transition/>
     </mc:Choice>
-    <mc:Fallback xmlns="" xmlns:c="http://schemas.openxmlformats.org/drawingml/2006/chart" xmlns:dgm="http://schemas.openxmlformats.org/drawingml/2006/diagram" xmlns:dsp="http://schemas.microsoft.com/office/drawing/2008/diagram">
+    <mc:Fallback xmlns:dsp="http://schemas.microsoft.com/office/drawing/2008/diagram" xmlns:dgm="http://schemas.openxmlformats.org/drawingml/2006/diagram" xmlns:c="http://schemas.openxmlformats.org/drawingml/2006/chart" xmlns="">
       <p:transition/>
     </mc:Fallback>
   </mc:AlternateContent>
@@ -4758,7 +4699,7 @@
     <mc:Choice Requires="p14">
       <p:transition/>
     </mc:Choice>
-    <mc:Fallback xmlns="" xmlns:c="http://schemas.openxmlformats.org/drawingml/2006/chart" xmlns:dgm="http://schemas.openxmlformats.org/drawingml/2006/diagram" xmlns:dsp="http://schemas.microsoft.com/office/drawing/2008/diagram">
+    <mc:Fallback xmlns:dsp="http://schemas.microsoft.com/office/drawing/2008/diagram" xmlns:dgm="http://schemas.openxmlformats.org/drawingml/2006/diagram" xmlns:c="http://schemas.openxmlformats.org/drawingml/2006/chart" xmlns="">
       <p:transition/>
     </mc:Fallback>
   </mc:AlternateContent>
@@ -6124,7 +6065,7 @@
     <mc:Choice Requires="p14">
       <p:transition/>
     </mc:Choice>
-    <mc:Fallback xmlns="" xmlns:c="http://schemas.openxmlformats.org/drawingml/2006/chart" xmlns:dgm="http://schemas.openxmlformats.org/drawingml/2006/diagram" xmlns:dsp="http://schemas.microsoft.com/office/drawing/2008/diagram">
+    <mc:Fallback xmlns:dsp="http://schemas.microsoft.com/office/drawing/2008/diagram" xmlns:dgm="http://schemas.openxmlformats.org/drawingml/2006/diagram" xmlns:c="http://schemas.openxmlformats.org/drawingml/2006/chart" xmlns="">
       <p:transition/>
     </mc:Fallback>
   </mc:AlternateContent>
@@ -6920,7 +6861,7 @@
     <mc:Choice Requires="p14">
       <p:transition/>
     </mc:Choice>
-    <mc:Fallback xmlns="" xmlns:c="http://schemas.openxmlformats.org/drawingml/2006/chart" xmlns:dgm="http://schemas.openxmlformats.org/drawingml/2006/diagram" xmlns:dsp="http://schemas.microsoft.com/office/drawing/2008/diagram">
+    <mc:Fallback xmlns:dsp="http://schemas.microsoft.com/office/drawing/2008/diagram" xmlns:dgm="http://schemas.openxmlformats.org/drawingml/2006/diagram" xmlns:c="http://schemas.openxmlformats.org/drawingml/2006/chart" xmlns="">
       <p:transition/>
     </mc:Fallback>
   </mc:AlternateContent>
@@ -8270,7 +8211,7 @@
     <mc:Choice Requires="p14">
       <p:transition/>
     </mc:Choice>
-    <mc:Fallback xmlns="" xmlns:c="http://schemas.openxmlformats.org/drawingml/2006/chart" xmlns:dgm="http://schemas.openxmlformats.org/drawingml/2006/diagram" xmlns:dsp="http://schemas.microsoft.com/office/drawing/2008/diagram">
+    <mc:Fallback xmlns:dsp="http://schemas.microsoft.com/office/drawing/2008/diagram" xmlns:dgm="http://schemas.openxmlformats.org/drawingml/2006/diagram" xmlns:c="http://schemas.openxmlformats.org/drawingml/2006/chart" xmlns="">
       <p:transition/>
     </mc:Fallback>
   </mc:AlternateContent>
@@ -9318,7 +9259,7 @@
     <mc:Choice Requires="p14">
       <p:transition/>
     </mc:Choice>
-    <mc:Fallback xmlns="" xmlns:c="http://schemas.openxmlformats.org/drawingml/2006/chart" xmlns:dgm="http://schemas.openxmlformats.org/drawingml/2006/diagram" xmlns:dsp="http://schemas.microsoft.com/office/drawing/2008/diagram">
+    <mc:Fallback xmlns:dsp="http://schemas.microsoft.com/office/drawing/2008/diagram" xmlns:dgm="http://schemas.openxmlformats.org/drawingml/2006/diagram" xmlns:c="http://schemas.openxmlformats.org/drawingml/2006/chart" xmlns="">
       <p:transition/>
     </mc:Fallback>
   </mc:AlternateContent>
@@ -9477,7 +9418,7 @@
     <mc:Choice Requires="p14">
       <p:transition/>
     </mc:Choice>
-    <mc:Fallback xmlns="" xmlns:c="http://schemas.openxmlformats.org/drawingml/2006/chart" xmlns:dgm="http://schemas.openxmlformats.org/drawingml/2006/diagram" xmlns:dsp="http://schemas.microsoft.com/office/drawing/2008/diagram">
+    <mc:Fallback xmlns:dsp="http://schemas.microsoft.com/office/drawing/2008/diagram" xmlns:dgm="http://schemas.openxmlformats.org/drawingml/2006/diagram" xmlns:c="http://schemas.openxmlformats.org/drawingml/2006/chart" xmlns="">
       <p:transition/>
     </mc:Fallback>
   </mc:AlternateContent>

</xml_diff>